<commit_message>
Remove photo from PPTX.
</commit_message>
<xml_diff>
--- a/Class 1 (DHRI) (public).pptx
+++ b/Class 1 (DHRI) (public).pptx
@@ -135,6 +135,14 @@
 </p:presentation>
 </file>
 
+<file path=ppt/revisionInfo.xml><?xml version="1.0" encoding="utf-8"?>
+<p1510:revInfo xmlns:a="http://schemas.openxmlformats.org/drawingml/2006/main" xmlns:r="http://schemas.openxmlformats.org/officeDocument/2006/relationships" xmlns:p1510="http://schemas.microsoft.com/office/powerpoint/2015/10/main">
+  <p1510:revLst>
+    <p1510:client id="{D55BD0E2-DA4B-4425-8581-512C0AFA821A}" v="1" dt="2019-09-16T20:30:55.178"/>
+  </p1510:revLst>
+</p1510:revInfo>
+</file>
+
 <file path=ppt/notesMasters/notesMaster1.xml><?xml version="1.0" encoding="utf-8"?>
 <p:notesMaster xmlns:a="http://schemas.openxmlformats.org/drawingml/2006/main" xmlns:r="http://schemas.openxmlformats.org/officeDocument/2006/relationships" xmlns:p="http://schemas.openxmlformats.org/presentationml/2006/main">
   <p:cSld>
@@ -217,7 +225,7 @@
           <a:p>
             <a:fld id="{437F9761-B527-41D4-9870-04E8D542DBE7}" type="datetimeFigureOut">
               <a:rPr lang="en-US" smtClean="0"/>
-              <a:t>8/22/2019</a:t>
+              <a:t>9/16/2019</a:t>
             </a:fld>
             <a:endParaRPr lang="en-US"/>
           </a:p>
@@ -1387,7 +1395,7 @@
           <a:p>
             <a:fld id="{A18237A6-6C4D-4926-862B-62F77BA33523}" type="datetimeFigureOut">
               <a:rPr lang="en-US" smtClean="0"/>
-              <a:t>8/22/2019</a:t>
+              <a:t>9/16/2019</a:t>
             </a:fld>
             <a:endParaRPr lang="en-US"/>
           </a:p>
@@ -1585,7 +1593,7 @@
           <a:p>
             <a:fld id="{A18237A6-6C4D-4926-862B-62F77BA33523}" type="datetimeFigureOut">
               <a:rPr lang="en-US" smtClean="0"/>
-              <a:t>8/22/2019</a:t>
+              <a:t>9/16/2019</a:t>
             </a:fld>
             <a:endParaRPr lang="en-US"/>
           </a:p>
@@ -1793,7 +1801,7 @@
           <a:p>
             <a:fld id="{A18237A6-6C4D-4926-862B-62F77BA33523}" type="datetimeFigureOut">
               <a:rPr lang="en-US" smtClean="0"/>
-              <a:t>8/22/2019</a:t>
+              <a:t>9/16/2019</a:t>
             </a:fld>
             <a:endParaRPr lang="en-US"/>
           </a:p>
@@ -1991,7 +1999,7 @@
           <a:p>
             <a:fld id="{A18237A6-6C4D-4926-862B-62F77BA33523}" type="datetimeFigureOut">
               <a:rPr lang="en-US" smtClean="0"/>
-              <a:t>8/22/2019</a:t>
+              <a:t>9/16/2019</a:t>
             </a:fld>
             <a:endParaRPr lang="en-US"/>
           </a:p>
@@ -2266,7 +2274,7 @@
           <a:p>
             <a:fld id="{A18237A6-6C4D-4926-862B-62F77BA33523}" type="datetimeFigureOut">
               <a:rPr lang="en-US" smtClean="0"/>
-              <a:t>8/22/2019</a:t>
+              <a:t>9/16/2019</a:t>
             </a:fld>
             <a:endParaRPr lang="en-US"/>
           </a:p>
@@ -2531,7 +2539,7 @@
           <a:p>
             <a:fld id="{A18237A6-6C4D-4926-862B-62F77BA33523}" type="datetimeFigureOut">
               <a:rPr lang="en-US" smtClean="0"/>
-              <a:t>8/22/2019</a:t>
+              <a:t>9/16/2019</a:t>
             </a:fld>
             <a:endParaRPr lang="en-US"/>
           </a:p>
@@ -2943,7 +2951,7 @@
           <a:p>
             <a:fld id="{A18237A6-6C4D-4926-862B-62F77BA33523}" type="datetimeFigureOut">
               <a:rPr lang="en-US" smtClean="0"/>
-              <a:t>8/22/2019</a:t>
+              <a:t>9/16/2019</a:t>
             </a:fld>
             <a:endParaRPr lang="en-US"/>
           </a:p>
@@ -3084,7 +3092,7 @@
           <a:p>
             <a:fld id="{A18237A6-6C4D-4926-862B-62F77BA33523}" type="datetimeFigureOut">
               <a:rPr lang="en-US" smtClean="0"/>
-              <a:t>8/22/2019</a:t>
+              <a:t>9/16/2019</a:t>
             </a:fld>
             <a:endParaRPr lang="en-US"/>
           </a:p>
@@ -3197,7 +3205,7 @@
           <a:p>
             <a:fld id="{A18237A6-6C4D-4926-862B-62F77BA33523}" type="datetimeFigureOut">
               <a:rPr lang="en-US" smtClean="0"/>
-              <a:t>8/22/2019</a:t>
+              <a:t>9/16/2019</a:t>
             </a:fld>
             <a:endParaRPr lang="en-US"/>
           </a:p>
@@ -3508,7 +3516,7 @@
           <a:p>
             <a:fld id="{A18237A6-6C4D-4926-862B-62F77BA33523}" type="datetimeFigureOut">
               <a:rPr lang="en-US" smtClean="0"/>
-              <a:t>8/22/2019</a:t>
+              <a:t>9/16/2019</a:t>
             </a:fld>
             <a:endParaRPr lang="en-US"/>
           </a:p>
@@ -3796,7 +3804,7 @@
           <a:p>
             <a:fld id="{A18237A6-6C4D-4926-862B-62F77BA33523}" type="datetimeFigureOut">
               <a:rPr lang="en-US" smtClean="0"/>
-              <a:t>8/22/2019</a:t>
+              <a:t>9/16/2019</a:t>
             </a:fld>
             <a:endParaRPr lang="en-US"/>
           </a:p>
@@ -4037,7 +4045,7 @@
           <a:p>
             <a:fld id="{A18237A6-6C4D-4926-862B-62F77BA33523}" type="datetimeFigureOut">
               <a:rPr lang="en-US" smtClean="0"/>
-              <a:t>8/22/2019</a:t>
+              <a:t>9/16/2019</a:t>
             </a:fld>
             <a:endParaRPr lang="en-US"/>
           </a:p>
@@ -6609,53 +6617,6 @@
           </a:p>
         </p:txBody>
       </p:sp>
-      <p:pic>
-        <p:nvPicPr>
-          <p:cNvPr id="1026" name="Picture 2" descr="http://blog.smu.edu/forum/files/2017/04/jo-guldi-450.jpg">
-            <a:extLst>
-              <a:ext uri="{FF2B5EF4-FFF2-40B4-BE49-F238E27FC236}">
-                <a16:creationId xmlns:a16="http://schemas.microsoft.com/office/drawing/2014/main" id="{44CCBC5B-CEBC-4E5C-BE3D-259CAA098854}"/>
-              </a:ext>
-            </a:extLst>
-          </p:cNvPr>
-          <p:cNvPicPr>
-            <a:picLocks noChangeAspect="1" noChangeArrowheads="1"/>
-          </p:cNvPicPr>
-          <p:nvPr/>
-        </p:nvPicPr>
-        <p:blipFill>
-          <a:blip r:embed="rId3">
-            <a:extLst>
-              <a:ext uri="{28A0092B-C50C-407E-A947-70E740481C1C}">
-                <a14:useLocalDpi xmlns:a14="http://schemas.microsoft.com/office/drawing/2010/main"/>
-              </a:ext>
-            </a:extLst>
-          </a:blip>
-          <a:srcRect/>
-          <a:stretch>
-            <a:fillRect/>
-          </a:stretch>
-        </p:blipFill>
-        <p:spPr bwMode="auto">
-          <a:xfrm>
-            <a:off x="6973166" y="1646093"/>
-            <a:ext cx="4286250" cy="4286250"/>
-          </a:xfrm>
-          <a:prstGeom prst="rect">
-            <a:avLst/>
-          </a:prstGeom>
-          <a:noFill/>
-          <a:extLst>
-            <a:ext uri="{909E8E84-426E-40DD-AFC4-6F175D3DCCD1}">
-              <a14:hiddenFill xmlns:a14="http://schemas.microsoft.com/office/drawing/2010/main">
-                <a:solidFill>
-                  <a:srgbClr val="FFFFFF"/>
-                </a:solidFill>
-              </a14:hiddenFill>
-            </a:ext>
-          </a:extLst>
-        </p:spPr>
-      </p:pic>
     </p:spTree>
     <p:extLst>
       <p:ext uri="{BB962C8B-B14F-4D97-AF65-F5344CB8AC3E}">

</xml_diff>